<commit_message>
commentaire dans le code d'asservissement
</commit_message>
<xml_diff>
--- a/Electrics/Schéma_électrique.pptx
+++ b/Electrics/Schéma_électrique.pptx
@@ -104,6 +104,11 @@
       </a:defRPr>
     </a:lvl9pPr>
   </p:defaultTextStyle>
+  <p:extLst>
+    <p:ext uri="{EFAFB233-063F-42B5-8137-9DF3F51BA10A}">
+      <p15:sldGuideLst xmlns:p15="http://schemas.microsoft.com/office/powerpoint/2012/main"/>
+    </p:ext>
+  </p:extLst>
 </p:presentation>
 </file>
 
@@ -256,7 +261,7 @@
           <a:p>
             <a:fld id="{980AA27D-9717-48EB-B0FB-34C31225BDF6}" type="datetimeFigureOut">
               <a:rPr lang="fr-CA" smtClean="0"/>
-              <a:t>2021-03-17</a:t>
+              <a:t>2021-04-11</a:t>
             </a:fld>
             <a:endParaRPr lang="fr-CA"/>
           </a:p>
@@ -456,7 +461,7 @@
           <a:p>
             <a:fld id="{980AA27D-9717-48EB-B0FB-34C31225BDF6}" type="datetimeFigureOut">
               <a:rPr lang="fr-CA" smtClean="0"/>
-              <a:t>2021-03-17</a:t>
+              <a:t>2021-04-11</a:t>
             </a:fld>
             <a:endParaRPr lang="fr-CA"/>
           </a:p>
@@ -666,7 +671,7 @@
           <a:p>
             <a:fld id="{980AA27D-9717-48EB-B0FB-34C31225BDF6}" type="datetimeFigureOut">
               <a:rPr lang="fr-CA" smtClean="0"/>
-              <a:t>2021-03-17</a:t>
+              <a:t>2021-04-11</a:t>
             </a:fld>
             <a:endParaRPr lang="fr-CA"/>
           </a:p>
@@ -866,7 +871,7 @@
           <a:p>
             <a:fld id="{980AA27D-9717-48EB-B0FB-34C31225BDF6}" type="datetimeFigureOut">
               <a:rPr lang="fr-CA" smtClean="0"/>
-              <a:t>2021-03-17</a:t>
+              <a:t>2021-04-11</a:t>
             </a:fld>
             <a:endParaRPr lang="fr-CA"/>
           </a:p>
@@ -1142,7 +1147,7 @@
           <a:p>
             <a:fld id="{980AA27D-9717-48EB-B0FB-34C31225BDF6}" type="datetimeFigureOut">
               <a:rPr lang="fr-CA" smtClean="0"/>
-              <a:t>2021-03-17</a:t>
+              <a:t>2021-04-11</a:t>
             </a:fld>
             <a:endParaRPr lang="fr-CA"/>
           </a:p>
@@ -1410,7 +1415,7 @@
           <a:p>
             <a:fld id="{980AA27D-9717-48EB-B0FB-34C31225BDF6}" type="datetimeFigureOut">
               <a:rPr lang="fr-CA" smtClean="0"/>
-              <a:t>2021-03-17</a:t>
+              <a:t>2021-04-11</a:t>
             </a:fld>
             <a:endParaRPr lang="fr-CA"/>
           </a:p>
@@ -1825,7 +1830,7 @@
           <a:p>
             <a:fld id="{980AA27D-9717-48EB-B0FB-34C31225BDF6}" type="datetimeFigureOut">
               <a:rPr lang="fr-CA" smtClean="0"/>
-              <a:t>2021-03-17</a:t>
+              <a:t>2021-04-11</a:t>
             </a:fld>
             <a:endParaRPr lang="fr-CA"/>
           </a:p>
@@ -1967,7 +1972,7 @@
           <a:p>
             <a:fld id="{980AA27D-9717-48EB-B0FB-34C31225BDF6}" type="datetimeFigureOut">
               <a:rPr lang="fr-CA" smtClean="0"/>
-              <a:t>2021-03-17</a:t>
+              <a:t>2021-04-11</a:t>
             </a:fld>
             <a:endParaRPr lang="fr-CA"/>
           </a:p>
@@ -2080,7 +2085,7 @@
           <a:p>
             <a:fld id="{980AA27D-9717-48EB-B0FB-34C31225BDF6}" type="datetimeFigureOut">
               <a:rPr lang="fr-CA" smtClean="0"/>
-              <a:t>2021-03-17</a:t>
+              <a:t>2021-04-11</a:t>
             </a:fld>
             <a:endParaRPr lang="fr-CA"/>
           </a:p>
@@ -2393,7 +2398,7 @@
           <a:p>
             <a:fld id="{980AA27D-9717-48EB-B0FB-34C31225BDF6}" type="datetimeFigureOut">
               <a:rPr lang="fr-CA" smtClean="0"/>
-              <a:t>2021-03-17</a:t>
+              <a:t>2021-04-11</a:t>
             </a:fld>
             <a:endParaRPr lang="fr-CA"/>
           </a:p>
@@ -2682,7 +2687,7 @@
           <a:p>
             <a:fld id="{980AA27D-9717-48EB-B0FB-34C31225BDF6}" type="datetimeFigureOut">
               <a:rPr lang="fr-CA" smtClean="0"/>
-              <a:t>2021-03-17</a:t>
+              <a:t>2021-04-11</a:t>
             </a:fld>
             <a:endParaRPr lang="fr-CA"/>
           </a:p>
@@ -2925,7 +2930,7 @@
           <a:p>
             <a:fld id="{980AA27D-9717-48EB-B0FB-34C31225BDF6}" type="datetimeFigureOut">
               <a:rPr lang="fr-CA" smtClean="0"/>
-              <a:t>2021-03-17</a:t>
+              <a:t>2021-04-11</a:t>
             </a:fld>
             <a:endParaRPr lang="fr-CA"/>
           </a:p>
@@ -4673,7 +4678,7 @@
         </p:nvSpPr>
         <p:spPr>
           <a:xfrm>
-            <a:off x="3091494" y="2298699"/>
+            <a:off x="3091494" y="2298700"/>
             <a:ext cx="1250950" cy="946151"/>
           </a:xfrm>
           <a:prstGeom prst="rect">
@@ -4722,14 +4727,14 @@
             </a:r>
           </a:p>
           <a:p>
-            <a:pPr algn="r"/>
+            <a:pPr algn="just"/>
             <a:r>
               <a:rPr lang="en-CA" sz="1100">
                 <a:solidFill>
                   <a:schemeClr val="tx1"/>
                 </a:solidFill>
               </a:rPr>
-              <a:t>SDA</a:t>
+              <a:t>MICRO USB     SDA</a:t>
             </a:r>
           </a:p>
           <a:p>
@@ -4770,8 +4775,8 @@
         </p:nvSpPr>
         <p:spPr>
           <a:xfrm>
-            <a:off x="3089336" y="2005981"/>
-            <a:ext cx="1250950" cy="292717"/>
+            <a:off x="3089336" y="2069176"/>
+            <a:ext cx="1258038" cy="292717"/>
           </a:xfrm>
           <a:prstGeom prst="rect">
             <a:avLst/>
@@ -5487,7 +5492,7 @@
         </p:blipFill>
         <p:spPr>
           <a:xfrm>
-            <a:off x="3056630" y="3704115"/>
+            <a:off x="3056630" y="3767907"/>
             <a:ext cx="658181" cy="658181"/>
           </a:xfrm>
           <a:prstGeom prst="rect">
@@ -5630,12 +5635,51 @@
           </a:fontRef>
         </p:style>
       </p:cxnSp>
+      <p:pic>
+        <p:nvPicPr>
+          <p:cNvPr id="4" name="Graphique 3" descr="Micro de radio avec un remplissage uni">
+            <a:extLst>
+              <a:ext uri="{FF2B5EF4-FFF2-40B4-BE49-F238E27FC236}">
+                <a16:creationId xmlns:a16="http://schemas.microsoft.com/office/drawing/2014/main" id="{1B4DC736-53B7-4612-BFFC-CF4B1ADFF321}"/>
+              </a:ext>
+            </a:extLst>
+          </p:cNvPr>
+          <p:cNvPicPr>
+            <a:picLocks noChangeAspect="1"/>
+          </p:cNvPicPr>
+          <p:nvPr/>
+        </p:nvPicPr>
+        <p:blipFill>
+          <a:blip r:embed="rId5">
+            <a:extLst>
+              <a:ext uri="{28A0092B-C50C-407E-A947-70E740481C1C}">
+                <a14:useLocalDpi xmlns:a14="http://schemas.microsoft.com/office/drawing/2010/main" val="0"/>
+              </a:ext>
+              <a:ext uri="{96DAC541-7B7A-43D3-8B79-37D633B846F1}">
+                <asvg:svgBlip xmlns:asvg="http://schemas.microsoft.com/office/drawing/2016/SVG/main" r:embed="rId6"/>
+              </a:ext>
+            </a:extLst>
+          </a:blip>
+          <a:stretch>
+            <a:fillRect/>
+          </a:stretch>
+        </p:blipFill>
+        <p:spPr>
+          <a:xfrm>
+            <a:off x="577102" y="2195734"/>
+            <a:ext cx="752167" cy="752167"/>
+          </a:xfrm>
+          <a:prstGeom prst="rect">
+            <a:avLst/>
+          </a:prstGeom>
+        </p:spPr>
+      </p:pic>
       <p:cxnSp>
         <p:nvCxnSpPr>
-          <p:cNvPr id="86" name="Connecteur droit 85">
-            <a:extLst>
-              <a:ext uri="{FF2B5EF4-FFF2-40B4-BE49-F238E27FC236}">
-                <a16:creationId xmlns:a16="http://schemas.microsoft.com/office/drawing/2014/main" id="{216126F2-7322-43E1-B2E1-411D124FABCC}"/>
+          <p:cNvPr id="50" name="Connecteur droit 49">
+            <a:extLst>
+              <a:ext uri="{FF2B5EF4-FFF2-40B4-BE49-F238E27FC236}">
+                <a16:creationId xmlns:a16="http://schemas.microsoft.com/office/drawing/2014/main" id="{B4AB406E-4F4D-432E-83CE-84F9D1935BF9}"/>
               </a:ext>
             </a:extLst>
           </p:cNvPr>
@@ -5645,9 +5689,467 @@
           <p:nvPr/>
         </p:nvCxnSpPr>
         <p:spPr>
-          <a:xfrm flipV="1">
-            <a:off x="3663950" y="4273550"/>
-            <a:ext cx="0" cy="120498"/>
+          <a:xfrm>
+            <a:off x="2477639" y="2685099"/>
+            <a:ext cx="623267" cy="1284"/>
+          </a:xfrm>
+          <a:prstGeom prst="line">
+            <a:avLst/>
+          </a:prstGeom>
+          <a:ln w="28575">
+            <a:solidFill>
+              <a:srgbClr val="7030A0"/>
+            </a:solidFill>
+          </a:ln>
+        </p:spPr>
+        <p:style>
+          <a:lnRef idx="1">
+            <a:schemeClr val="accent1"/>
+          </a:lnRef>
+          <a:fillRef idx="0">
+            <a:schemeClr val="accent1"/>
+          </a:fillRef>
+          <a:effectRef idx="0">
+            <a:schemeClr val="accent1"/>
+          </a:effectRef>
+          <a:fontRef idx="minor">
+            <a:schemeClr val="tx1"/>
+          </a:fontRef>
+        </p:style>
+      </p:cxnSp>
+      <p:sp>
+        <p:nvSpPr>
+          <p:cNvPr id="2" name="Rectangle 1">
+            <a:extLst>
+              <a:ext uri="{FF2B5EF4-FFF2-40B4-BE49-F238E27FC236}">
+                <a16:creationId xmlns:a16="http://schemas.microsoft.com/office/drawing/2014/main" id="{B0F7A3AD-CF89-4C7D-9D6F-BE3C0120C717}"/>
+              </a:ext>
+            </a:extLst>
+          </p:cNvPr>
+          <p:cNvSpPr/>
+          <p:nvPr/>
+        </p:nvSpPr>
+        <p:spPr>
+          <a:xfrm>
+            <a:off x="1547025" y="2097897"/>
+            <a:ext cx="1242503" cy="1198195"/>
+          </a:xfrm>
+          <a:prstGeom prst="rect">
+            <a:avLst/>
+          </a:prstGeom>
+          <a:solidFill>
+            <a:srgbClr val="ECD8E2"/>
+          </a:solidFill>
+          <a:ln>
+            <a:solidFill>
+              <a:schemeClr val="tx1"/>
+            </a:solidFill>
+          </a:ln>
+        </p:spPr>
+        <p:style>
+          <a:lnRef idx="2">
+            <a:schemeClr val="accent1">
+              <a:shade val="50000"/>
+            </a:schemeClr>
+          </a:lnRef>
+          <a:fillRef idx="1">
+            <a:schemeClr val="accent1"/>
+          </a:fillRef>
+          <a:effectRef idx="0">
+            <a:schemeClr val="accent1"/>
+          </a:effectRef>
+          <a:fontRef idx="minor">
+            <a:schemeClr val="lt1"/>
+          </a:fontRef>
+        </p:style>
+        <p:txBody>
+          <a:bodyPr rtlCol="0" anchor="ctr"/>
+          <a:lstStyle/>
+          <a:p>
+            <a:r>
+              <a:rPr lang="fr-CA" sz="1100">
+                <a:solidFill>
+                  <a:schemeClr val="tx1"/>
+                </a:solidFill>
+              </a:rPr>
+              <a:t>USB</a:t>
+            </a:r>
+          </a:p>
+          <a:p>
+            <a:pPr algn="r"/>
+            <a:r>
+              <a:rPr lang="fr-CA" sz="1100">
+                <a:solidFill>
+                  <a:schemeClr val="tx1"/>
+                </a:solidFill>
+              </a:rPr>
+              <a:t>USB</a:t>
+            </a:r>
+          </a:p>
+          <a:p>
+            <a:r>
+              <a:rPr lang="fr-CA" sz="1100">
+                <a:solidFill>
+                  <a:schemeClr val="tx1"/>
+                </a:solidFill>
+              </a:rPr>
+              <a:t>MICRO USB</a:t>
+            </a:r>
+          </a:p>
+        </p:txBody>
+      </p:sp>
+      <p:sp>
+        <p:nvSpPr>
+          <p:cNvPr id="42" name="Rectangle 41">
+            <a:extLst>
+              <a:ext uri="{FF2B5EF4-FFF2-40B4-BE49-F238E27FC236}">
+                <a16:creationId xmlns:a16="http://schemas.microsoft.com/office/drawing/2014/main" id="{6BDA6D8C-07FC-4F4C-9617-1E7329A4E271}"/>
+              </a:ext>
+            </a:extLst>
+          </p:cNvPr>
+          <p:cNvSpPr/>
+          <p:nvPr/>
+        </p:nvSpPr>
+        <p:spPr>
+          <a:xfrm>
+            <a:off x="1544867" y="2097897"/>
+            <a:ext cx="1244661" cy="287205"/>
+          </a:xfrm>
+          <a:prstGeom prst="rect">
+            <a:avLst/>
+          </a:prstGeom>
+          <a:solidFill>
+            <a:srgbClr val="CD97B2"/>
+          </a:solidFill>
+          <a:ln>
+            <a:solidFill>
+              <a:schemeClr val="tx1"/>
+            </a:solidFill>
+          </a:ln>
+        </p:spPr>
+        <p:style>
+          <a:lnRef idx="2">
+            <a:schemeClr val="accent1">
+              <a:shade val="50000"/>
+            </a:schemeClr>
+          </a:lnRef>
+          <a:fillRef idx="1">
+            <a:schemeClr val="accent1"/>
+          </a:fillRef>
+          <a:effectRef idx="0">
+            <a:schemeClr val="accent1"/>
+          </a:effectRef>
+          <a:fontRef idx="minor">
+            <a:schemeClr val="lt1"/>
+          </a:fontRef>
+        </p:style>
+        <p:txBody>
+          <a:bodyPr rtlCol="0" anchor="ctr"/>
+          <a:lstStyle/>
+          <a:p>
+            <a:pPr algn="ctr"/>
+            <a:r>
+              <a:rPr lang="fr-CA" sz="1100">
+                <a:solidFill>
+                  <a:schemeClr val="tx1"/>
+                </a:solidFill>
+              </a:rPr>
+              <a:t>RASPBERRY PI</a:t>
+            </a:r>
+          </a:p>
+        </p:txBody>
+      </p:sp>
+      <p:cxnSp>
+        <p:nvCxnSpPr>
+          <p:cNvPr id="45" name="Connecteur droit 44">
+            <a:extLst>
+              <a:ext uri="{FF2B5EF4-FFF2-40B4-BE49-F238E27FC236}">
+                <a16:creationId xmlns:a16="http://schemas.microsoft.com/office/drawing/2014/main" id="{2330CC96-F318-4A29-8CF8-8E23DA9EC196}"/>
+              </a:ext>
+            </a:extLst>
+          </p:cNvPr>
+          <p:cNvCxnSpPr>
+            <a:cxnSpLocks/>
+          </p:cNvCxnSpPr>
+          <p:nvPr/>
+        </p:nvCxnSpPr>
+        <p:spPr>
+          <a:xfrm>
+            <a:off x="1113671" y="2579167"/>
+            <a:ext cx="431196" cy="0"/>
+          </a:xfrm>
+          <a:prstGeom prst="line">
+            <a:avLst/>
+          </a:prstGeom>
+          <a:ln w="28575">
+            <a:solidFill>
+              <a:srgbClr val="404040"/>
+            </a:solidFill>
+          </a:ln>
+        </p:spPr>
+        <p:style>
+          <a:lnRef idx="1">
+            <a:schemeClr val="accent1"/>
+          </a:lnRef>
+          <a:fillRef idx="0">
+            <a:schemeClr val="accent1"/>
+          </a:fillRef>
+          <a:effectRef idx="0">
+            <a:schemeClr val="accent1"/>
+          </a:effectRef>
+          <a:fontRef idx="minor">
+            <a:schemeClr val="tx1"/>
+          </a:fontRef>
+        </p:style>
+      </p:cxnSp>
+      <p:pic>
+        <p:nvPicPr>
+          <p:cNvPr id="56" name="Image 55">
+            <a:extLst>
+              <a:ext uri="{FF2B5EF4-FFF2-40B4-BE49-F238E27FC236}">
+                <a16:creationId xmlns:a16="http://schemas.microsoft.com/office/drawing/2014/main" id="{F9141BB6-744B-4D74-A1D1-FF083EF7CFFE}"/>
+              </a:ext>
+            </a:extLst>
+          </p:cNvPr>
+          <p:cNvPicPr>
+            <a:picLocks noChangeAspect="1"/>
+          </p:cNvPicPr>
+          <p:nvPr/>
+        </p:nvPicPr>
+        <p:blipFill>
+          <a:blip r:embed="rId4">
+            <a:duotone>
+              <a:prstClr val="black"/>
+              <a:schemeClr val="bg2">
+                <a:lumMod val="90000"/>
+                <a:tint val="45000"/>
+                <a:satMod val="400000"/>
+              </a:schemeClr>
+            </a:duotone>
+            <a:extLst>
+              <a:ext uri="{28A0092B-C50C-407E-A947-70E740481C1C}">
+                <a14:useLocalDpi xmlns:a14="http://schemas.microsoft.com/office/drawing/2010/main" val="0"/>
+              </a:ext>
+            </a:extLst>
+          </a:blip>
+          <a:stretch>
+            <a:fillRect/>
+          </a:stretch>
+        </p:blipFill>
+        <p:spPr>
+          <a:xfrm>
+            <a:off x="1698409" y="3626959"/>
+            <a:ext cx="658181" cy="658181"/>
+          </a:xfrm>
+          <a:prstGeom prst="rect">
+            <a:avLst/>
+          </a:prstGeom>
+        </p:spPr>
+      </p:pic>
+      <p:sp>
+        <p:nvSpPr>
+          <p:cNvPr id="21" name="Rectangle 20">
+            <a:extLst>
+              <a:ext uri="{FF2B5EF4-FFF2-40B4-BE49-F238E27FC236}">
+                <a16:creationId xmlns:a16="http://schemas.microsoft.com/office/drawing/2014/main" id="{7B33F7D6-F31A-438E-AE90-21D9A6BDAFD9}"/>
+              </a:ext>
+            </a:extLst>
+          </p:cNvPr>
+          <p:cNvSpPr/>
+          <p:nvPr/>
+        </p:nvSpPr>
+        <p:spPr>
+          <a:xfrm>
+            <a:off x="1921624" y="3911027"/>
+            <a:ext cx="262266" cy="133923"/>
+          </a:xfrm>
+          <a:prstGeom prst="rect">
+            <a:avLst/>
+          </a:prstGeom>
+          <a:solidFill>
+            <a:schemeClr val="tx1">
+              <a:lumMod val="85000"/>
+              <a:lumOff val="15000"/>
+            </a:schemeClr>
+          </a:solidFill>
+          <a:ln>
+            <a:noFill/>
+          </a:ln>
+        </p:spPr>
+        <p:style>
+          <a:lnRef idx="2">
+            <a:schemeClr val="dk1">
+              <a:shade val="50000"/>
+            </a:schemeClr>
+          </a:lnRef>
+          <a:fillRef idx="1">
+            <a:schemeClr val="dk1"/>
+          </a:fillRef>
+          <a:effectRef idx="0">
+            <a:schemeClr val="dk1"/>
+          </a:effectRef>
+          <a:fontRef idx="minor">
+            <a:schemeClr val="lt1"/>
+          </a:fontRef>
+        </p:style>
+        <p:txBody>
+          <a:bodyPr rtlCol="0" anchor="ctr"/>
+          <a:lstStyle/>
+          <a:p>
+            <a:pPr algn="ctr"/>
+            <a:endParaRPr lang="fr-CA"/>
+          </a:p>
+        </p:txBody>
+      </p:sp>
+      <p:sp>
+        <p:nvSpPr>
+          <p:cNvPr id="22" name="ZoneTexte 21">
+            <a:extLst>
+              <a:ext uri="{FF2B5EF4-FFF2-40B4-BE49-F238E27FC236}">
+                <a16:creationId xmlns:a16="http://schemas.microsoft.com/office/drawing/2014/main" id="{0A962B64-B00E-4171-A0D5-CBD0908631C0}"/>
+              </a:ext>
+            </a:extLst>
+          </p:cNvPr>
+          <p:cNvSpPr txBox="1"/>
+          <p:nvPr/>
+        </p:nvSpPr>
+        <p:spPr>
+          <a:xfrm>
+            <a:off x="1841630" y="3867150"/>
+            <a:ext cx="452129" cy="276999"/>
+          </a:xfrm>
+          <a:prstGeom prst="rect">
+            <a:avLst/>
+          </a:prstGeom>
+          <a:noFill/>
+        </p:spPr>
+        <p:txBody>
+          <a:bodyPr wrap="square" rtlCol="0">
+            <a:spAutoFit/>
+          </a:bodyPr>
+          <a:lstStyle/>
+          <a:p>
+            <a:r>
+              <a:rPr lang="fr-CA" sz="1200">
+                <a:solidFill>
+                  <a:schemeClr val="bg1"/>
+                </a:solidFill>
+                <a:latin typeface="Arial Black" panose="020B0A04020102020204" pitchFamily="34" charset="0"/>
+                <a:cs typeface="Aharoni" panose="020B0604020202020204" pitchFamily="2" charset="-79"/>
+              </a:rPr>
+              <a:t>5V</a:t>
+            </a:r>
+          </a:p>
+        </p:txBody>
+      </p:sp>
+      <p:cxnSp>
+        <p:nvCxnSpPr>
+          <p:cNvPr id="59" name="Connecteur droit 58">
+            <a:extLst>
+              <a:ext uri="{FF2B5EF4-FFF2-40B4-BE49-F238E27FC236}">
+                <a16:creationId xmlns:a16="http://schemas.microsoft.com/office/drawing/2014/main" id="{A281FB32-ACF1-4A28-8CBF-96FDED93516A}"/>
+              </a:ext>
+            </a:extLst>
+          </p:cNvPr>
+          <p:cNvCxnSpPr>
+            <a:cxnSpLocks/>
+          </p:cNvCxnSpPr>
+          <p:nvPr/>
+        </p:nvCxnSpPr>
+        <p:spPr>
+          <a:xfrm>
+            <a:off x="1329269" y="4242996"/>
+            <a:ext cx="977325" cy="0"/>
+          </a:xfrm>
+          <a:prstGeom prst="line">
+            <a:avLst/>
+          </a:prstGeom>
+          <a:ln w="28575">
+            <a:solidFill>
+              <a:schemeClr val="bg2">
+                <a:lumMod val="10000"/>
+              </a:schemeClr>
+            </a:solidFill>
+          </a:ln>
+        </p:spPr>
+        <p:style>
+          <a:lnRef idx="1">
+            <a:schemeClr val="accent1"/>
+          </a:lnRef>
+          <a:fillRef idx="0">
+            <a:schemeClr val="accent1"/>
+          </a:fillRef>
+          <a:effectRef idx="0">
+            <a:schemeClr val="accent1"/>
+          </a:effectRef>
+          <a:fontRef idx="minor">
+            <a:schemeClr val="tx1"/>
+          </a:fontRef>
+        </p:style>
+      </p:cxnSp>
+      <p:cxnSp>
+        <p:nvCxnSpPr>
+          <p:cNvPr id="61" name="Connecteur droit 60">
+            <a:extLst>
+              <a:ext uri="{FF2B5EF4-FFF2-40B4-BE49-F238E27FC236}">
+                <a16:creationId xmlns:a16="http://schemas.microsoft.com/office/drawing/2014/main" id="{6B9630FD-D2A1-4221-AF49-6246F9399FB2}"/>
+              </a:ext>
+            </a:extLst>
+          </p:cNvPr>
+          <p:cNvCxnSpPr>
+            <a:cxnSpLocks/>
+          </p:cNvCxnSpPr>
+          <p:nvPr/>
+        </p:nvCxnSpPr>
+        <p:spPr>
+          <a:xfrm>
+            <a:off x="1329269" y="2844800"/>
+            <a:ext cx="0" cy="1414574"/>
+          </a:xfrm>
+          <a:prstGeom prst="line">
+            <a:avLst/>
+          </a:prstGeom>
+          <a:ln w="28575">
+            <a:solidFill>
+              <a:schemeClr val="bg2">
+                <a:lumMod val="10000"/>
+              </a:schemeClr>
+            </a:solidFill>
+          </a:ln>
+        </p:spPr>
+        <p:style>
+          <a:lnRef idx="1">
+            <a:schemeClr val="accent1"/>
+          </a:lnRef>
+          <a:fillRef idx="0">
+            <a:schemeClr val="accent1"/>
+          </a:fillRef>
+          <a:effectRef idx="0">
+            <a:schemeClr val="accent1"/>
+          </a:effectRef>
+          <a:fontRef idx="minor">
+            <a:schemeClr val="tx1"/>
+          </a:fontRef>
+        </p:style>
+      </p:cxnSp>
+      <p:cxnSp>
+        <p:nvCxnSpPr>
+          <p:cNvPr id="64" name="Connecteur droit 63">
+            <a:extLst>
+              <a:ext uri="{FF2B5EF4-FFF2-40B4-BE49-F238E27FC236}">
+                <a16:creationId xmlns:a16="http://schemas.microsoft.com/office/drawing/2014/main" id="{DCCC950F-BC91-4380-81FD-520FB640F446}"/>
+              </a:ext>
+            </a:extLst>
+          </p:cNvPr>
+          <p:cNvCxnSpPr>
+            <a:cxnSpLocks/>
+          </p:cNvCxnSpPr>
+          <p:nvPr/>
+        </p:nvCxnSpPr>
+        <p:spPr>
+          <a:xfrm>
+            <a:off x="1339988" y="2856024"/>
+            <a:ext cx="204879" cy="0"/>
           </a:xfrm>
           <a:prstGeom prst="line">
             <a:avLst/>

</xml_diff>